<commit_message>
Modification ppt Architecture-Flux (partie Technique)
</commit_message>
<xml_diff>
--- a/Documentation/Architecture/Architechture-Flux.pptx
+++ b/Documentation/Architecture/Architechture-Flux.pptx
@@ -280,7 +280,7 @@
             <a:fld id="{938FC91C-8F72-4FC3-9EE1-E00D3E055101}" type="datetimeFigureOut">
               <a:rPr lang="fr-FR" smtClean="0"/>
               <a:pPr/>
-              <a:t>28/12/2019</a:t>
+              <a:t>03/01/2020</a:t>
             </a:fld>
             <a:endParaRPr lang="fr-FR" dirty="0"/>
           </a:p>
@@ -495,7 +495,7 @@
             <a:fld id="{938FC91C-8F72-4FC3-9EE1-E00D3E055101}" type="datetimeFigureOut">
               <a:rPr lang="fr-FR" smtClean="0"/>
               <a:pPr/>
-              <a:t>28/12/2019</a:t>
+              <a:t>03/01/2020</a:t>
             </a:fld>
             <a:endParaRPr lang="fr-FR" dirty="0"/>
           </a:p>
@@ -675,7 +675,7 @@
             <a:fld id="{938FC91C-8F72-4FC3-9EE1-E00D3E055101}" type="datetimeFigureOut">
               <a:rPr lang="fr-FR" smtClean="0"/>
               <a:pPr/>
-              <a:t>28/12/2019</a:t>
+              <a:t>03/01/2020</a:t>
             </a:fld>
             <a:endParaRPr lang="fr-FR" dirty="0"/>
           </a:p>
@@ -790,7 +790,7 @@
           <a:p>
             <a:fld id="{938FC91C-8F72-4FC3-9EE1-E00D3E055101}" type="datetimeFigureOut">
               <a:rPr lang="fr-FR" smtClean="0"/>
-              <a:t>28/12/2019</a:t>
+              <a:t>03/01/2020</a:t>
             </a:fld>
             <a:endParaRPr lang="fr-FR"/>
           </a:p>
@@ -1043,7 +1043,7 @@
           <a:p>
             <a:fld id="{938FC91C-8F72-4FC3-9EE1-E00D3E055101}" type="datetimeFigureOut">
               <a:rPr lang="fr-FR" smtClean="0"/>
-              <a:t>28/12/2019</a:t>
+              <a:t>03/01/2020</a:t>
             </a:fld>
             <a:endParaRPr lang="fr-FR" dirty="0"/>
           </a:p>
@@ -1685,7 +1685,7 @@
             </a:pPr>
             <a:r>
               <a:rPr lang="fr-FR" sz="1800" dirty="0"/>
-              <a:t>Coordination temporel des images (passe à la même heure)</a:t>
+              <a:t>Coordination temporelle des images (passent à la même heure)</a:t>
             </a:r>
           </a:p>
         </p:txBody>
@@ -1914,7 +1914,7 @@
             </a:pPr>
             <a:r>
               <a:rPr lang="fr-FR" sz="1800" dirty="0"/>
-              <a:t>Seul 14h de vidéo sont exploitables à la (lumière du jour) de 6h à 20h</a:t>
+              <a:t>Seulement 14h de vidéo sont exploitables (à la lumière du jour) de 6h à 20h</a:t>
             </a:r>
           </a:p>
         </p:txBody>
@@ -2859,7 +2859,7 @@
                   <a:schemeClr val="tx1"/>
                 </a:solidFill>
               </a:rPr>
-              <a:t>16h-2h</a:t>
+              <a:t>2h-16h</a:t>
             </a:r>
             <a:endParaRPr lang="fr-FR" sz="1200" dirty="0"/>
           </a:p>
@@ -3535,6 +3535,119 @@
           </a:p>
         </p:txBody>
       </p:sp>
+      <p:sp>
+        <p:nvSpPr>
+          <p:cNvPr id="2" name="ZoneTexte 1">
+            <a:extLst>
+              <a:ext uri="{FF2B5EF4-FFF2-40B4-BE49-F238E27FC236}">
+                <a16:creationId xmlns:a16="http://schemas.microsoft.com/office/drawing/2014/main" id="{5A1A0124-E9CA-4313-9C1C-2B330FB80D1F}"/>
+              </a:ext>
+            </a:extLst>
+          </p:cNvPr>
+          <p:cNvSpPr txBox="1"/>
+          <p:nvPr/>
+        </p:nvSpPr>
+        <p:spPr>
+          <a:xfrm>
+            <a:off x="4298784" y="1988125"/>
+            <a:ext cx="3594431" cy="5355312"/>
+          </a:xfrm>
+          <a:prstGeom prst="rect">
+            <a:avLst/>
+          </a:prstGeom>
+          <a:noFill/>
+        </p:spPr>
+        <p:txBody>
+          <a:bodyPr wrap="square" rtlCol="0">
+            <a:spAutoFit/>
+          </a:bodyPr>
+          <a:lstStyle/>
+          <a:p>
+            <a:pPr marL="285750" indent="-285750">
+              <a:buFont typeface="Arial" panose="020B0604020202020204" pitchFamily="34" charset="0"/>
+              <a:buChar char="•"/>
+            </a:pPr>
+            <a:r>
+              <a:rPr lang="fr-FR" dirty="0">
+                <a:solidFill>
+                  <a:schemeClr val="bg1"/>
+                </a:solidFill>
+                <a:latin typeface="Abadi Extra Light" panose="020B0204020104020204" pitchFamily="34" charset="0"/>
+              </a:rPr>
+              <a:t>Alternance de flux streaming (diffusion des images en direct) et de rediffusion d’image donc nécessite, à la fois, un bon espace mémoire (pour l’enregistrement de 10h) et une bonne connexion internet pour du streaming plus ou moins fluide,</a:t>
+            </a:r>
+          </a:p>
+          <a:p>
+            <a:pPr marL="285750" indent="-285750">
+              <a:buFont typeface="Arial" panose="020B0604020202020204" pitchFamily="34" charset="0"/>
+              <a:buChar char="•"/>
+            </a:pPr>
+            <a:r>
+              <a:rPr lang="fr-FR" dirty="0">
+                <a:solidFill>
+                  <a:schemeClr val="bg1"/>
+                </a:solidFill>
+                <a:latin typeface="Abadi Extra Light" panose="020B0204020104020204" pitchFamily="34" charset="0"/>
+              </a:rPr>
+              <a:t>Risque de perturbations de la connexion internet lors de diffusion streaming pendant la journée,</a:t>
+            </a:r>
+          </a:p>
+          <a:p>
+            <a:pPr marL="285750" indent="-285750">
+              <a:buFont typeface="Arial" panose="020B0604020202020204" pitchFamily="34" charset="0"/>
+              <a:buChar char="•"/>
+            </a:pPr>
+            <a:r>
+              <a:rPr lang="fr-FR" dirty="0">
+                <a:solidFill>
+                  <a:schemeClr val="bg1"/>
+                </a:solidFill>
+                <a:latin typeface="Abadi Extra Light" panose="020B0204020104020204" pitchFamily="34" charset="0"/>
+              </a:rPr>
+              <a:t>Donc risque d’avoir une vidéo finale (sur les boîtiers) de moins bonne qualité.</a:t>
+            </a:r>
+          </a:p>
+          <a:p>
+            <a:pPr marL="285750" indent="-285750">
+              <a:buFont typeface="Arial" panose="020B0604020202020204" pitchFamily="34" charset="0"/>
+              <a:buChar char="•"/>
+            </a:pPr>
+            <a:endParaRPr lang="fr-FR" dirty="0">
+              <a:solidFill>
+                <a:schemeClr val="bg1"/>
+              </a:solidFill>
+              <a:latin typeface="Abadi Extra Light" panose="020B0204020104020204" pitchFamily="34" charset="0"/>
+            </a:endParaRPr>
+          </a:p>
+          <a:p>
+            <a:pPr marL="285750" indent="-285750">
+              <a:buFont typeface="Arial" panose="020B0604020202020204" pitchFamily="34" charset="0"/>
+              <a:buChar char="•"/>
+            </a:pPr>
+            <a:endParaRPr lang="fr-FR" dirty="0">
+              <a:solidFill>
+                <a:schemeClr val="bg1"/>
+              </a:solidFill>
+              <a:latin typeface="Abadi Extra Light" panose="020B0204020104020204" pitchFamily="34" charset="0"/>
+            </a:endParaRPr>
+          </a:p>
+          <a:p>
+            <a:pPr marL="285750" indent="-285750">
+              <a:buFont typeface="Arial" panose="020B0604020202020204" pitchFamily="34" charset="0"/>
+              <a:buChar char="•"/>
+            </a:pPr>
+            <a:endParaRPr lang="fr-FR" dirty="0">
+              <a:solidFill>
+                <a:schemeClr val="bg1"/>
+              </a:solidFill>
+              <a:latin typeface="Abadi Extra Light" panose="020B0204020104020204" pitchFamily="34" charset="0"/>
+            </a:endParaRPr>
+          </a:p>
+          <a:p>
+            <a:endParaRPr lang="en-US" dirty="0"/>
+          </a:p>
+        </p:txBody>
+      </p:sp>
     </p:spTree>
     <p:extLst>
       <p:ext uri="{BB962C8B-B14F-4D97-AF65-F5344CB8AC3E}">
@@ -5099,6 +5212,107 @@
           </a:p>
         </p:txBody>
       </p:sp>
+      <p:sp>
+        <p:nvSpPr>
+          <p:cNvPr id="15" name="ZoneTexte 14">
+            <a:extLst>
+              <a:ext uri="{FF2B5EF4-FFF2-40B4-BE49-F238E27FC236}">
+                <a16:creationId xmlns:a16="http://schemas.microsoft.com/office/drawing/2014/main" id="{743E4347-DD86-491D-BCB4-3CB4F80EBFEA}"/>
+              </a:ext>
+            </a:extLst>
+          </p:cNvPr>
+          <p:cNvSpPr txBox="1"/>
+          <p:nvPr/>
+        </p:nvSpPr>
+        <p:spPr>
+          <a:xfrm>
+            <a:off x="4298785" y="1976579"/>
+            <a:ext cx="3594430" cy="4247317"/>
+          </a:xfrm>
+          <a:prstGeom prst="rect">
+            <a:avLst/>
+          </a:prstGeom>
+          <a:noFill/>
+        </p:spPr>
+        <p:txBody>
+          <a:bodyPr wrap="square" rtlCol="0">
+            <a:spAutoFit/>
+          </a:bodyPr>
+          <a:lstStyle/>
+          <a:p>
+            <a:pPr marL="285750" indent="-285750">
+              <a:buFont typeface="Arial" panose="020B0604020202020204" pitchFamily="34" charset="0"/>
+              <a:buChar char="•"/>
+            </a:pPr>
+            <a:r>
+              <a:rPr lang="fr-FR" dirty="0">
+                <a:solidFill>
+                  <a:schemeClr val="bg1"/>
+                </a:solidFill>
+                <a:latin typeface="Abadi Extra Light" panose="020B0204020104020204" pitchFamily="34" charset="0"/>
+              </a:rPr>
+              <a:t>Enregistrement continu donc nécessite un espace mémoire conséquent pour le stockage des vidéos,</a:t>
+            </a:r>
+          </a:p>
+          <a:p>
+            <a:pPr marL="285750" indent="-285750">
+              <a:buFont typeface="Arial" panose="020B0604020202020204" pitchFamily="34" charset="0"/>
+              <a:buChar char="•"/>
+            </a:pPr>
+            <a:r>
+              <a:rPr lang="fr-FR" dirty="0">
+                <a:solidFill>
+                  <a:schemeClr val="bg1"/>
+                </a:solidFill>
+                <a:latin typeface="Abadi Extra Light" panose="020B0204020104020204" pitchFamily="34" charset="0"/>
+              </a:rPr>
+              <a:t>Une bonne connexion internet est, une nouvelle fois, importante pour le flux streaming,</a:t>
+            </a:r>
+          </a:p>
+          <a:p>
+            <a:pPr marL="285750" indent="-285750">
+              <a:buFont typeface="Arial" panose="020B0604020202020204" pitchFamily="34" charset="0"/>
+              <a:buChar char="•"/>
+            </a:pPr>
+            <a:r>
+              <a:rPr lang="fr-FR" dirty="0">
+                <a:solidFill>
+                  <a:schemeClr val="bg1"/>
+                </a:solidFill>
+                <a:latin typeface="Abadi Extra Light" panose="020B0204020104020204" pitchFamily="34" charset="0"/>
+              </a:rPr>
+              <a:t>Risque de perturbations de la connexion internet lors de diffusion streaming pendant la journée,</a:t>
+            </a:r>
+          </a:p>
+          <a:p>
+            <a:pPr marL="285750" indent="-285750">
+              <a:buFont typeface="Arial" panose="020B0604020202020204" pitchFamily="34" charset="0"/>
+              <a:buChar char="•"/>
+            </a:pPr>
+            <a:r>
+              <a:rPr lang="fr-FR" dirty="0">
+                <a:solidFill>
+                  <a:schemeClr val="bg1"/>
+                </a:solidFill>
+                <a:latin typeface="Abadi Extra Light" panose="020B0204020104020204" pitchFamily="34" charset="0"/>
+              </a:rPr>
+              <a:t>Donc risque d’avoir une vidéo finale (sur les boîtiers) de moins bonne qualité.</a:t>
+            </a:r>
+          </a:p>
+          <a:p>
+            <a:pPr marL="285750" indent="-285750">
+              <a:buFont typeface="Arial" panose="020B0604020202020204" pitchFamily="34" charset="0"/>
+              <a:buChar char="•"/>
+            </a:pPr>
+            <a:endParaRPr lang="fr-FR" dirty="0">
+              <a:solidFill>
+                <a:schemeClr val="bg1"/>
+              </a:solidFill>
+              <a:latin typeface="Abadi Extra Light" panose="020B0204020104020204" pitchFamily="34" charset="0"/>
+            </a:endParaRPr>
+          </a:p>
+        </p:txBody>
+      </p:sp>
     </p:spTree>
     <p:extLst>
       <p:ext uri="{BB962C8B-B14F-4D97-AF65-F5344CB8AC3E}">
@@ -6499,6 +6713,65 @@
           <a:lstStyle/>
           <a:p>
             <a:endParaRPr lang="fr-FR" dirty="0"/>
+          </a:p>
+        </p:txBody>
+      </p:sp>
+      <p:sp>
+        <p:nvSpPr>
+          <p:cNvPr id="15" name="ZoneTexte 14">
+            <a:extLst>
+              <a:ext uri="{FF2B5EF4-FFF2-40B4-BE49-F238E27FC236}">
+                <a16:creationId xmlns:a16="http://schemas.microsoft.com/office/drawing/2014/main" id="{E0112551-657E-4905-B43E-786DB13DAD00}"/>
+              </a:ext>
+            </a:extLst>
+          </p:cNvPr>
+          <p:cNvSpPr txBox="1"/>
+          <p:nvPr/>
+        </p:nvSpPr>
+        <p:spPr>
+          <a:xfrm>
+            <a:off x="4298785" y="1976579"/>
+            <a:ext cx="3594430" cy="2308324"/>
+          </a:xfrm>
+          <a:prstGeom prst="rect">
+            <a:avLst/>
+          </a:prstGeom>
+          <a:noFill/>
+        </p:spPr>
+        <p:txBody>
+          <a:bodyPr wrap="square" rtlCol="0">
+            <a:spAutoFit/>
+          </a:bodyPr>
+          <a:lstStyle/>
+          <a:p>
+            <a:pPr marL="285750" indent="-285750">
+              <a:buFont typeface="Arial" panose="020B0604020202020204" pitchFamily="34" charset="0"/>
+              <a:buChar char="•"/>
+            </a:pPr>
+            <a:r>
+              <a:rPr lang="fr-FR" dirty="0">
+                <a:solidFill>
+                  <a:schemeClr val="bg1"/>
+                </a:solidFill>
+                <a:latin typeface="Abadi Extra Light" panose="020B0204020104020204" pitchFamily="34" charset="0"/>
+              </a:rPr>
+              <a:t>Risque moins important concernant la qualité de la connexion internet lors du chargement de la vidéo (car fait de nuit),</a:t>
+            </a:r>
+          </a:p>
+          <a:p>
+            <a:pPr marL="285750" indent="-285750">
+              <a:buFont typeface="Arial" panose="020B0604020202020204" pitchFamily="34" charset="0"/>
+              <a:buChar char="•"/>
+            </a:pPr>
+            <a:r>
+              <a:rPr lang="fr-FR" dirty="0">
+                <a:solidFill>
+                  <a:schemeClr val="bg1"/>
+                </a:solidFill>
+                <a:latin typeface="Abadi Extra Light" panose="020B0204020104020204" pitchFamily="34" charset="0"/>
+              </a:rPr>
+              <a:t>Risque moins important concernant la qualité de la vidéo diffusée ensuite sur les boîtiers,</a:t>
+            </a:r>
           </a:p>
         </p:txBody>
       </p:sp>

</xml_diff>